<commit_message>
All Beginner Slide Master and logo fixed, Pseudocode and How to Use updated
</commit_message>
<xml_diff>
--- a/translations/en-us/beginner/BasicLineFollower.pptx
+++ b/translations/en-us/beginner/BasicLineFollower.pptx
@@ -227,7 +227,7 @@
           <a:p>
             <a:fld id="{F8D9B3D7-15CB-9343-AA49-EFB5A8F33F18}" type="datetimeFigureOut">
               <a:rPr lang="en-US" smtClean="0"/>
-              <a:t>3/21/15</a:t>
+              <a:t>11/14/15</a:t>
             </a:fld>
             <a:endParaRPr lang="en-US"/>
           </a:p>
@@ -393,7 +393,7 @@
           <a:p>
             <a:fld id="{FD3EFF1E-85A1-6640-AFB9-C38833E80A84}" type="datetimeFigureOut">
               <a:rPr lang="en-US" smtClean="0"/>
-              <a:t>3/21/15</a:t>
+              <a:t>11/14/15</a:t>
             </a:fld>
             <a:endParaRPr lang="en-US"/>
           </a:p>
@@ -785,7 +785,7 @@
           </a:ln>
           <a:extLst>
             <a:ext uri="{909E8E84-426E-40dd-AFC4-6F175D3DCCD1}">
-              <a14:hiddenFill xmlns:a14="http://schemas.microsoft.com/office/drawing/2010/main" xmlns="">
+              <a14:hiddenFill xmlns="" xmlns:a14="http://schemas.microsoft.com/office/drawing/2010/main">
                 <a:solidFill>
                   <a:srgbClr val="FFFFFF"/>
                 </a:solidFill>
@@ -808,14 +808,14 @@
           <a:noFill/>
           <a:extLst>
             <a:ext uri="{909E8E84-426E-40dd-AFC4-6F175D3DCCD1}">
-              <a14:hiddenFill xmlns:a14="http://schemas.microsoft.com/office/drawing/2010/main" xmlns="">
+              <a14:hiddenFill xmlns="" xmlns:a14="http://schemas.microsoft.com/office/drawing/2010/main">
                 <a:solidFill>
                   <a:srgbClr val="FFFFFF"/>
                 </a:solidFill>
               </a14:hiddenFill>
             </a:ext>
             <a:ext uri="{91240B29-F687-4f45-9708-019B960494DF}">
-              <a14:hiddenLine xmlns:a14="http://schemas.microsoft.com/office/drawing/2010/main" xmlns="" w="9525">
+              <a14:hiddenLine xmlns="" xmlns:a14="http://schemas.microsoft.com/office/drawing/2010/main" w="9525">
                 <a:solidFill>
                   <a:srgbClr val="000000"/>
                 </a:solidFill>
@@ -855,14 +855,14 @@
           <a:noFill/>
           <a:extLst>
             <a:ext uri="{909E8E84-426E-40dd-AFC4-6F175D3DCCD1}">
-              <a14:hiddenFill xmlns:a14="http://schemas.microsoft.com/office/drawing/2010/main" xmlns="">
+              <a14:hiddenFill xmlns="" xmlns:a14="http://schemas.microsoft.com/office/drawing/2010/main">
                 <a:solidFill>
                   <a:srgbClr val="FFFFFF"/>
                 </a:solidFill>
               </a14:hiddenFill>
             </a:ext>
             <a:ext uri="{91240B29-F687-4f45-9708-019B960494DF}">
-              <a14:hiddenLine xmlns:a14="http://schemas.microsoft.com/office/drawing/2010/main" xmlns="" w="9525">
+              <a14:hiddenLine xmlns="" xmlns:a14="http://schemas.microsoft.com/office/drawing/2010/main" w="9525">
                 <a:solidFill>
                   <a:srgbClr val="000000"/>
                 </a:solidFill>
@@ -1049,7 +1049,7 @@
           </a:ln>
           <a:extLst>
             <a:ext uri="{909E8E84-426E-40dd-AFC4-6F175D3DCCD1}">
-              <a14:hiddenFill xmlns:a14="http://schemas.microsoft.com/office/drawing/2010/main" xmlns="">
+              <a14:hiddenFill xmlns="" xmlns:a14="http://schemas.microsoft.com/office/drawing/2010/main">
                 <a:solidFill>
                   <a:srgbClr val="FFFFFF"/>
                 </a:solidFill>
@@ -1072,14 +1072,14 @@
           <a:noFill/>
           <a:extLst>
             <a:ext uri="{909E8E84-426E-40dd-AFC4-6F175D3DCCD1}">
-              <a14:hiddenFill xmlns:a14="http://schemas.microsoft.com/office/drawing/2010/main" xmlns="">
+              <a14:hiddenFill xmlns="" xmlns:a14="http://schemas.microsoft.com/office/drawing/2010/main">
                 <a:solidFill>
                   <a:srgbClr val="FFFFFF"/>
                 </a:solidFill>
               </a14:hiddenFill>
             </a:ext>
             <a:ext uri="{91240B29-F687-4f45-9708-019B960494DF}">
-              <a14:hiddenLine xmlns:a14="http://schemas.microsoft.com/office/drawing/2010/main" xmlns="" w="9525">
+              <a14:hiddenLine xmlns="" xmlns:a14="http://schemas.microsoft.com/office/drawing/2010/main" w="9525">
                 <a:solidFill>
                   <a:srgbClr val="000000"/>
                 </a:solidFill>
@@ -1119,14 +1119,14 @@
           <a:noFill/>
           <a:extLst>
             <a:ext uri="{909E8E84-426E-40dd-AFC4-6F175D3DCCD1}">
-              <a14:hiddenFill xmlns:a14="http://schemas.microsoft.com/office/drawing/2010/main" xmlns="">
+              <a14:hiddenFill xmlns="" xmlns:a14="http://schemas.microsoft.com/office/drawing/2010/main">
                 <a:solidFill>
                   <a:srgbClr val="FFFFFF"/>
                 </a:solidFill>
               </a14:hiddenFill>
             </a:ext>
             <a:ext uri="{91240B29-F687-4f45-9708-019B960494DF}">
-              <a14:hiddenLine xmlns:a14="http://schemas.microsoft.com/office/drawing/2010/main" xmlns="" w="9525">
+              <a14:hiddenLine xmlns="" xmlns:a14="http://schemas.microsoft.com/office/drawing/2010/main" w="9525">
                 <a:solidFill>
                   <a:srgbClr val="000000"/>
                 </a:solidFill>
@@ -1551,7 +1551,7 @@
           <a:p>
             <a:fld id="{DFEB761B-93B6-4F06-B1B1-18CE8B776B63}" type="datetime1">
               <a:rPr lang="en-US" smtClean="0"/>
-              <a:t>3/21/15</a:t>
+              <a:t>11/14/15</a:t>
             </a:fld>
             <a:endParaRPr lang="en-US"/>
           </a:p>
@@ -1842,7 +1842,7 @@
           <a:p>
             <a:fld id="{ED9FEDC6-6210-49BD-9CBD-95D1AAFCD29A}" type="datetime1">
               <a:rPr lang="en-US" smtClean="0"/>
-              <a:t>3/21/15</a:t>
+              <a:t>11/14/15</a:t>
             </a:fld>
             <a:endParaRPr lang="en-US"/>
           </a:p>
@@ -2029,7 +2029,7 @@
           <a:p>
             <a:fld id="{6971F44B-8CBC-44B6-AD55-CE65907D5BC2}" type="datetime1">
               <a:rPr lang="en-US" smtClean="0"/>
-              <a:t>3/21/15</a:t>
+              <a:t>11/14/15</a:t>
             </a:fld>
             <a:endParaRPr lang="en-US"/>
           </a:p>
@@ -2216,7 +2216,7 @@
           <a:p>
             <a:fld id="{B744FD62-63FF-49C2-8E55-5CF77D7A0691}" type="datetime1">
               <a:rPr lang="en-US" smtClean="0"/>
-              <a:t>3/21/15</a:t>
+              <a:t>11/14/15</a:t>
             </a:fld>
             <a:endParaRPr lang="en-US"/>
           </a:p>
@@ -2477,7 +2477,7 @@
           <a:p>
             <a:fld id="{E0281C12-C1B2-4EB6-B00D-5EA047746BFE}" type="datetime1">
               <a:rPr lang="en-US" smtClean="0"/>
-              <a:t>3/21/15</a:t>
+              <a:t>11/14/15</a:t>
             </a:fld>
             <a:endParaRPr lang="en-US"/>
           </a:p>
@@ -2777,7 +2777,7 @@
           <a:p>
             <a:fld id="{F7E73DC5-FABD-4CD0-9B35-897035875FB2}" type="datetime1">
               <a:rPr lang="en-US" smtClean="0"/>
-              <a:t>3/21/15</a:t>
+              <a:t>11/14/15</a:t>
             </a:fld>
             <a:endParaRPr lang="en-US"/>
           </a:p>
@@ -3228,7 +3228,7 @@
           <a:p>
             <a:fld id="{6291E551-81A0-4A41-B672-39D202B67A67}" type="datetime1">
               <a:rPr lang="en-US" smtClean="0"/>
-              <a:t>3/21/15</a:t>
+              <a:t>11/14/15</a:t>
             </a:fld>
             <a:endParaRPr lang="en-US"/>
           </a:p>
@@ -3353,7 +3353,7 @@
           <a:p>
             <a:fld id="{D25C93B4-6620-4F3A-9A8C-6A619592FB07}" type="datetime1">
               <a:rPr lang="en-US" smtClean="0"/>
-              <a:t>3/21/15</a:t>
+              <a:t>11/14/15</a:t>
             </a:fld>
             <a:endParaRPr lang="en-US"/>
           </a:p>
@@ -3455,7 +3455,7 @@
           <a:p>
             <a:fld id="{E73D6DDA-3CA6-4617-8B7E-B5E120C5BC04}" type="datetime1">
               <a:rPr lang="en-US" smtClean="0"/>
-              <a:t>3/21/15</a:t>
+              <a:t>11/14/15</a:t>
             </a:fld>
             <a:endParaRPr lang="en-US"/>
           </a:p>
@@ -3709,7 +3709,7 @@
           <a:p>
             <a:fld id="{19A0D056-0074-4E40-B1A7-1409BEB26454}" type="datetime1">
               <a:rPr lang="en-US" smtClean="0"/>
-              <a:t>3/21/15</a:t>
+              <a:t>11/14/15</a:t>
             </a:fld>
             <a:endParaRPr lang="en-US"/>
           </a:p>
@@ -4015,7 +4015,7 @@
           <a:p>
             <a:fld id="{EEAB3C24-83FF-47B3-BCFC-45BFD7130B03}" type="datetime1">
               <a:rPr lang="en-US" smtClean="0"/>
-              <a:t>3/21/15</a:t>
+              <a:t>11/14/15</a:t>
             </a:fld>
             <a:endParaRPr lang="en-US"/>
           </a:p>
@@ -4313,7 +4313,7 @@
           <a:p>
             <a:fld id="{9643CE61-8FA2-40C7-B457-2C5467A12179}" type="datetime1">
               <a:rPr lang="en-US" smtClean="0"/>
-              <a:t>3/21/15</a:t>
+              <a:t>11/14/15</a:t>
             </a:fld>
             <a:endParaRPr lang="en-US"/>
           </a:p>
@@ -4886,36 +4886,6 @@
           </a:p>
         </p:txBody>
       </p:sp>
-      <p:pic>
-        <p:nvPicPr>
-          <p:cNvPr id="3" name="Picture 2" descr="Droidslogo2.png"/>
-          <p:cNvPicPr>
-            <a:picLocks noChangeAspect="1"/>
-          </p:cNvPicPr>
-          <p:nvPr/>
-        </p:nvPicPr>
-        <p:blipFill>
-          <a:blip r:embed="rId3">
-            <a:extLst>
-              <a:ext uri="{28A0092B-C50C-407E-A947-70E740481C1C}">
-                <a14:useLocalDpi xmlns:a14="http://schemas.microsoft.com/office/drawing/2010/main" val="0"/>
-              </a:ext>
-            </a:extLst>
-          </a:blip>
-          <a:stretch>
-            <a:fillRect/>
-          </a:stretch>
-        </p:blipFill>
-        <p:spPr>
-          <a:xfrm>
-            <a:off x="402306" y="5456830"/>
-            <a:ext cx="1085195" cy="1085195"/>
-          </a:xfrm>
-          <a:prstGeom prst="rect">
-            <a:avLst/>
-          </a:prstGeom>
-        </p:spPr>
-      </p:pic>
       <p:sp>
         <p:nvSpPr>
           <p:cNvPr id="4" name="TextBox 3"/>
@@ -4969,7 +4939,7 @@
           <p:nvPr/>
         </p:nvPicPr>
         <p:blipFill>
-          <a:blip r:embed="rId4">
+          <a:blip r:embed="rId3">
             <a:extLst>
               <a:ext uri="{28A0092B-C50C-407E-A947-70E740481C1C}">
                 <a14:useLocalDpi xmlns:a14="http://schemas.microsoft.com/office/drawing/2010/main" val="0"/>
@@ -4992,13 +4962,43 @@
           <a:noFill/>
           <a:extLst>
             <a:ext uri="{909E8E84-426E-40dd-AFC4-6F175D3DCCD1}">
-              <a14:hiddenFill xmlns:a14="http://schemas.microsoft.com/office/drawing/2010/main" xmlns="">
+              <a14:hiddenFill xmlns="" xmlns:a14="http://schemas.microsoft.com/office/drawing/2010/main">
                 <a:solidFill>
                   <a:srgbClr val="FFFFFF"/>
                 </a:solidFill>
               </a14:hiddenFill>
             </a:ext>
           </a:extLst>
+        </p:spPr>
+      </p:pic>
+      <p:pic>
+        <p:nvPicPr>
+          <p:cNvPr id="5" name="Picture 4"/>
+          <p:cNvPicPr>
+            <a:picLocks noChangeAspect="1"/>
+          </p:cNvPicPr>
+          <p:nvPr/>
+        </p:nvPicPr>
+        <p:blipFill>
+          <a:blip r:embed="rId4">
+            <a:extLst>
+              <a:ext uri="{28A0092B-C50C-407E-A947-70E740481C1C}">
+                <a14:useLocalDpi xmlns:a14="http://schemas.microsoft.com/office/drawing/2010/main" val="0"/>
+              </a:ext>
+            </a:extLst>
+          </a:blip>
+          <a:stretch>
+            <a:fillRect/>
+          </a:stretch>
+        </p:blipFill>
+        <p:spPr>
+          <a:xfrm>
+            <a:off x="231228" y="5244661"/>
+            <a:ext cx="1283834" cy="1228201"/>
+          </a:xfrm>
+          <a:prstGeom prst="rect">
+            <a:avLst/>
+          </a:prstGeom>
         </p:spPr>
       </p:pic>
     </p:spTree>
@@ -5103,11 +5103,7 @@
             </a:r>
             <a:r>
               <a:rPr lang="en-US" dirty="0" smtClean="0"/>
-              <a:t>right</a:t>
-            </a:r>
-            <a:r>
-              <a:rPr lang="en-US" dirty="0" smtClean="0"/>
-              <a:t>. </a:t>
+              <a:t>right. </a:t>
             </a:r>
             <a:r>
               <a:rPr lang="en-US" dirty="0"/>
@@ -6213,14 +6209,14 @@
           </a:ln>
           <a:extLst>
             <a:ext uri="{909E8E84-426E-40dd-AFC4-6F175D3DCCD1}">
-              <a14:hiddenFill xmlns:a14="http://schemas.microsoft.com/office/drawing/2010/main" xmlns="">
+              <a14:hiddenFill xmlns="" xmlns:a14="http://schemas.microsoft.com/office/drawing/2010/main">
                 <a:solidFill>
                   <a:srgbClr val="FFFFFF"/>
                 </a:solidFill>
               </a14:hiddenFill>
             </a:ext>
             <a:ext uri="{91240B29-F687-4f45-9708-019B960494DF}">
-              <a14:hiddenLine xmlns:a14="http://schemas.microsoft.com/office/drawing/2010/main" xmlns="" w="9525">
+              <a14:hiddenLine xmlns="" xmlns:a14="http://schemas.microsoft.com/office/drawing/2010/main" w="9525">
                 <a:solidFill>
                   <a:srgbClr val="000000"/>
                 </a:solidFill>
@@ -6723,14 +6719,14 @@
           </a:ln>
           <a:extLst>
             <a:ext uri="{909E8E84-426E-40dd-AFC4-6F175D3DCCD1}">
-              <a14:hiddenFill xmlns:a14="http://schemas.microsoft.com/office/drawing/2010/main" xmlns="">
+              <a14:hiddenFill xmlns="" xmlns:a14="http://schemas.microsoft.com/office/drawing/2010/main">
                 <a:solidFill>
                   <a:srgbClr val="FFFFFF"/>
                 </a:solidFill>
               </a14:hiddenFill>
             </a:ext>
             <a:ext uri="{91240B29-F687-4f45-9708-019B960494DF}">
-              <a14:hiddenLine xmlns:a14="http://schemas.microsoft.com/office/drawing/2010/main" xmlns="" w="9525">
+              <a14:hiddenLine xmlns="" xmlns:a14="http://schemas.microsoft.com/office/drawing/2010/main" w="9525">
                 <a:solidFill>
                   <a:srgbClr val="000000"/>
                 </a:solidFill>
@@ -8355,7 +8351,7 @@
           <a:effectLst/>
           <a:extLst>
             <a:ext uri="{91240B29-F687-4f45-9708-019B960494DF}">
-              <a14:hiddenLine xmlns:a14="http://schemas.microsoft.com/office/drawing/2010/main" xmlns="" w="9525">
+              <a14:hiddenLine xmlns="" xmlns:a14="http://schemas.microsoft.com/office/drawing/2010/main" w="9525">
                 <a:solidFill>
                   <a:schemeClr val="tx1"/>
                 </a:solidFill>
@@ -8365,7 +8361,7 @@
               </a14:hiddenLine>
             </a:ext>
             <a:ext uri="{AF507438-7753-43e0-B8FC-AC1667EBCBE1}">
-              <a14:hiddenEffects xmlns:a14="http://schemas.microsoft.com/office/drawing/2010/main" xmlns="">
+              <a14:hiddenEffects xmlns="" xmlns:a14="http://schemas.microsoft.com/office/drawing/2010/main">
                 <a:effectLst>
                   <a:outerShdw dist="35921" dir="2700000" algn="ctr" rotWithShape="0">
                     <a:schemeClr val="bg2"/>
@@ -8718,7 +8714,7 @@
           <a:noFill/>
           <a:extLst>
             <a:ext uri="{909E8E84-426E-40dd-AFC4-6F175D3DCCD1}">
-              <a14:hiddenFill xmlns:a14="http://schemas.microsoft.com/office/drawing/2010/main" xmlns="">
+              <a14:hiddenFill xmlns="" xmlns:a14="http://schemas.microsoft.com/office/drawing/2010/main">
                 <a:solidFill>
                   <a:srgbClr val="FFFFFF"/>
                 </a:solidFill>
@@ -13849,7 +13845,7 @@
               </a:ln>
               <a:extLst>
                 <a:ext uri="{909E8E84-426E-40dd-AFC4-6F175D3DCCD1}">
-                  <a14:hiddenFill xmlns:a14="http://schemas.microsoft.com/office/drawing/2010/main" xmlns="">
+                  <a14:hiddenFill xmlns="" xmlns:a14="http://schemas.microsoft.com/office/drawing/2010/main">
                     <a:noFill/>
                   </a14:hiddenFill>
                 </a:ext>
@@ -13894,7 +13890,7 @@
               </a:ln>
               <a:extLst>
                 <a:ext uri="{909E8E84-426E-40dd-AFC4-6F175D3DCCD1}">
-                  <a14:hiddenFill xmlns:a14="http://schemas.microsoft.com/office/drawing/2010/main" xmlns="">
+                  <a14:hiddenFill xmlns="" xmlns:a14="http://schemas.microsoft.com/office/drawing/2010/main">
                     <a:noFill/>
                   </a14:hiddenFill>
                 </a:ext>
@@ -13956,7 +13952,7 @@
               </a:ln>
               <a:extLst>
                 <a:ext uri="{909E8E84-426E-40dd-AFC4-6F175D3DCCD1}">
-                  <a14:hiddenFill xmlns:a14="http://schemas.microsoft.com/office/drawing/2010/main" xmlns="">
+                  <a14:hiddenFill xmlns="" xmlns:a14="http://schemas.microsoft.com/office/drawing/2010/main">
                     <a:noFill/>
                   </a14:hiddenFill>
                 </a:ext>
@@ -14001,7 +13997,7 @@
               </a:ln>
               <a:extLst>
                 <a:ext uri="{909E8E84-426E-40dd-AFC4-6F175D3DCCD1}">
-                  <a14:hiddenFill xmlns:a14="http://schemas.microsoft.com/office/drawing/2010/main" xmlns="">
+                  <a14:hiddenFill xmlns="" xmlns:a14="http://schemas.microsoft.com/office/drawing/2010/main">
                     <a:noFill/>
                   </a14:hiddenFill>
                 </a:ext>

</xml_diff>